<commit_message>
added seq.diagram to presentation
</commit_message>
<xml_diff>
--- a/ch.bfh.bti7081.s2013.yellow/doc/cs1_task07/cs01_task07_presentation.pptx
+++ b/ch.bfh.bti7081.s2013.yellow/doc/cs1_task07/cs01_task07_presentation.pptx
@@ -4056,7 +4056,6 @@
               <a:rPr lang="de-CH" dirty="0" smtClean="0"/>
               <a:t>19.04.2013</a:t>
             </a:r>
-            <a:endParaRPr lang="de-CH" dirty="0" smtClean="0"/>
           </a:p>
         </p:txBody>
       </p:sp>
@@ -4079,15 +4078,7 @@
           <a:p>
             <a:r>
               <a:rPr lang="de-CH" sz="4400" dirty="0" smtClean="0"/>
-              <a:t>Präsentation CS1 Task </a:t>
-            </a:r>
-            <a:r>
-              <a:rPr lang="de-CH" sz="4400" dirty="0" smtClean="0"/>
-              <a:t>7</a:t>
-            </a:r>
-            <a:r>
-              <a:rPr lang="de-CH" sz="4400" dirty="0" smtClean="0"/>
-              <a:t/>
+              <a:t>Präsentation CS1 Task 7</a:t>
             </a:r>
             <a:br>
               <a:rPr lang="de-CH" sz="4400" dirty="0" smtClean="0"/>
@@ -5253,6 +5244,55 @@
           </a:p>
         </p:txBody>
       </p:sp>
+      <p:pic>
+        <p:nvPicPr>
+          <p:cNvPr id="2050" name="Picture 2"/>
+          <p:cNvPicPr>
+            <a:picLocks noChangeAspect="1" noChangeArrowheads="1"/>
+          </p:cNvPicPr>
+          <p:nvPr/>
+        </p:nvPicPr>
+        <p:blipFill>
+          <a:blip r:embed="rId2">
+            <a:extLst>
+              <a:ext uri="{28A0092B-C50C-407E-A947-70E740481C1C}">
+                <a14:useLocalDpi xmlns:a14="http://schemas.microsoft.com/office/drawing/2010/main" val="0"/>
+              </a:ext>
+            </a:extLst>
+          </a:blip>
+          <a:srcRect/>
+          <a:stretch>
+            <a:fillRect/>
+          </a:stretch>
+        </p:blipFill>
+        <p:spPr bwMode="auto">
+          <a:xfrm>
+            <a:off x="1187624" y="1340768"/>
+            <a:ext cx="6500045" cy="5098520"/>
+          </a:xfrm>
+          <a:prstGeom prst="rect">
+            <a:avLst/>
+          </a:prstGeom>
+          <a:noFill/>
+          <a:ln w="9525">
+            <a:solidFill>
+              <a:schemeClr val="tx1"/>
+            </a:solidFill>
+            <a:miter lim="800000"/>
+            <a:headEnd/>
+            <a:tailEnd/>
+          </a:ln>
+          <a:extLst>
+            <a:ext uri="{909E8E84-426E-40DD-AFC4-6F175D3DCCD1}">
+              <a14:hiddenFill xmlns:a14="http://schemas.microsoft.com/office/drawing/2010/main">
+                <a:solidFill>
+                  <a:schemeClr val="accent1"/>
+                </a:solidFill>
+              </a14:hiddenFill>
+            </a:ext>
+          </a:extLst>
+        </p:spPr>
+      </p:pic>
     </p:spTree>
     <p:extLst>
       <p:ext uri="{BB962C8B-B14F-4D97-AF65-F5344CB8AC3E}">
@@ -5381,6 +5421,55 @@
           </a:p>
         </p:txBody>
       </p:sp>
+      <p:pic>
+        <p:nvPicPr>
+          <p:cNvPr id="1026" name="Picture 2"/>
+          <p:cNvPicPr>
+            <a:picLocks noChangeAspect="1" noChangeArrowheads="1"/>
+          </p:cNvPicPr>
+          <p:nvPr/>
+        </p:nvPicPr>
+        <p:blipFill>
+          <a:blip r:embed="rId2">
+            <a:extLst>
+              <a:ext uri="{28A0092B-C50C-407E-A947-70E740481C1C}">
+                <a14:useLocalDpi xmlns:a14="http://schemas.microsoft.com/office/drawing/2010/main" val="0"/>
+              </a:ext>
+            </a:extLst>
+          </a:blip>
+          <a:srcRect/>
+          <a:stretch>
+            <a:fillRect/>
+          </a:stretch>
+        </p:blipFill>
+        <p:spPr bwMode="auto">
+          <a:xfrm>
+            <a:off x="251520" y="1412776"/>
+            <a:ext cx="8713837" cy="4907871"/>
+          </a:xfrm>
+          <a:prstGeom prst="rect">
+            <a:avLst/>
+          </a:prstGeom>
+          <a:noFill/>
+          <a:ln w="9525">
+            <a:solidFill>
+              <a:schemeClr val="tx1"/>
+            </a:solidFill>
+            <a:miter lim="800000"/>
+            <a:headEnd/>
+            <a:tailEnd/>
+          </a:ln>
+          <a:extLst>
+            <a:ext uri="{909E8E84-426E-40DD-AFC4-6F175D3DCCD1}">
+              <a14:hiddenFill xmlns:a14="http://schemas.microsoft.com/office/drawing/2010/main">
+                <a:solidFill>
+                  <a:schemeClr val="accent1"/>
+                </a:solidFill>
+              </a14:hiddenFill>
+            </a:ext>
+          </a:extLst>
+        </p:spPr>
+      </p:pic>
     </p:spTree>
     <p:extLst>
       <p:ext uri="{BB962C8B-B14F-4D97-AF65-F5344CB8AC3E}">

</xml_diff>